<commit_message>
Week #2 :: { Homework } - DEBUG Search (v2)
Week #2 :: { Homework } - DEBUG Search (v2) partial debugging completed.
</commit_message>
<xml_diff>
--- a/Wk 1/Goal1Duel1Flowchart.pptx
+++ b/Wk 1/Goal1Duel1Flowchart.pptx
@@ -289,7 +289,7 @@
           <a:p>
             <a:fld id="{5F8EC1C8-0ECA-4A40-9D7C-013B4E5C752B}" type="datetimeFigureOut">
               <a:rPr lang="en-US" smtClean="0"/>
-              <a:t>2/8/15</a:t>
+              <a:t>2/16/15</a:t>
             </a:fld>
             <a:endParaRPr lang="en-US"/>
           </a:p>
@@ -459,7 +459,7 @@
           <a:p>
             <a:fld id="{5F8EC1C8-0ECA-4A40-9D7C-013B4E5C752B}" type="datetimeFigureOut">
               <a:rPr lang="en-US" smtClean="0"/>
-              <a:t>2/8/15</a:t>
+              <a:t>2/16/15</a:t>
             </a:fld>
             <a:endParaRPr lang="en-US"/>
           </a:p>
@@ -639,7 +639,7 @@
           <a:p>
             <a:fld id="{5F8EC1C8-0ECA-4A40-9D7C-013B4E5C752B}" type="datetimeFigureOut">
               <a:rPr lang="en-US" smtClean="0"/>
-              <a:t>2/8/15</a:t>
+              <a:t>2/16/15</a:t>
             </a:fld>
             <a:endParaRPr lang="en-US"/>
           </a:p>
@@ -809,7 +809,7 @@
           <a:p>
             <a:fld id="{5F8EC1C8-0ECA-4A40-9D7C-013B4E5C752B}" type="datetimeFigureOut">
               <a:rPr lang="en-US" smtClean="0"/>
-              <a:t>2/8/15</a:t>
+              <a:t>2/16/15</a:t>
             </a:fld>
             <a:endParaRPr lang="en-US"/>
           </a:p>
@@ -1055,7 +1055,7 @@
           <a:p>
             <a:fld id="{5F8EC1C8-0ECA-4A40-9D7C-013B4E5C752B}" type="datetimeFigureOut">
               <a:rPr lang="en-US" smtClean="0"/>
-              <a:t>2/8/15</a:t>
+              <a:t>2/16/15</a:t>
             </a:fld>
             <a:endParaRPr lang="en-US"/>
           </a:p>
@@ -1343,7 +1343,7 @@
           <a:p>
             <a:fld id="{5F8EC1C8-0ECA-4A40-9D7C-013B4E5C752B}" type="datetimeFigureOut">
               <a:rPr lang="en-US" smtClean="0"/>
-              <a:t>2/8/15</a:t>
+              <a:t>2/16/15</a:t>
             </a:fld>
             <a:endParaRPr lang="en-US"/>
           </a:p>
@@ -1765,7 +1765,7 @@
           <a:p>
             <a:fld id="{5F8EC1C8-0ECA-4A40-9D7C-013B4E5C752B}" type="datetimeFigureOut">
               <a:rPr lang="en-US" smtClean="0"/>
-              <a:t>2/8/15</a:t>
+              <a:t>2/16/15</a:t>
             </a:fld>
             <a:endParaRPr lang="en-US"/>
           </a:p>
@@ -1883,7 +1883,7 @@
           <a:p>
             <a:fld id="{5F8EC1C8-0ECA-4A40-9D7C-013B4E5C752B}" type="datetimeFigureOut">
               <a:rPr lang="en-US" smtClean="0"/>
-              <a:t>2/8/15</a:t>
+              <a:t>2/16/15</a:t>
             </a:fld>
             <a:endParaRPr lang="en-US"/>
           </a:p>
@@ -1978,7 +1978,7 @@
           <a:p>
             <a:fld id="{5F8EC1C8-0ECA-4A40-9D7C-013B4E5C752B}" type="datetimeFigureOut">
               <a:rPr lang="en-US" smtClean="0"/>
-              <a:t>2/8/15</a:t>
+              <a:t>2/16/15</a:t>
             </a:fld>
             <a:endParaRPr lang="en-US"/>
           </a:p>
@@ -2255,7 +2255,7 @@
           <a:p>
             <a:fld id="{5F8EC1C8-0ECA-4A40-9D7C-013B4E5C752B}" type="datetimeFigureOut">
               <a:rPr lang="en-US" smtClean="0"/>
-              <a:t>2/8/15</a:t>
+              <a:t>2/16/15</a:t>
             </a:fld>
             <a:endParaRPr lang="en-US"/>
           </a:p>
@@ -2508,7 +2508,7 @@
           <a:p>
             <a:fld id="{5F8EC1C8-0ECA-4A40-9D7C-013B4E5C752B}" type="datetimeFigureOut">
               <a:rPr lang="en-US" smtClean="0"/>
-              <a:t>2/8/15</a:t>
+              <a:t>2/16/15</a:t>
             </a:fld>
             <a:endParaRPr lang="en-US"/>
           </a:p>
@@ -2721,7 +2721,7 @@
           <a:p>
             <a:fld id="{5F8EC1C8-0ECA-4A40-9D7C-013B4E5C752B}" type="datetimeFigureOut">
               <a:rPr lang="en-US" smtClean="0"/>
-              <a:t>2/8/15</a:t>
+              <a:t>2/16/15</a:t>
             </a:fld>
             <a:endParaRPr lang="en-US"/>
           </a:p>
@@ -3325,7 +3325,7 @@
         </p:nvSpPr>
         <p:spPr>
           <a:xfrm>
-            <a:off x="1099343" y="331583"/>
+            <a:off x="610867" y="198198"/>
             <a:ext cx="720287" cy="307557"/>
           </a:xfrm>
           <a:prstGeom prst="roundRect">
@@ -3370,7 +3370,7 @@
         </p:nvSpPr>
         <p:spPr>
           <a:xfrm>
-            <a:off x="2311385" y="302748"/>
+            <a:off x="1942657" y="87168"/>
             <a:ext cx="1223769" cy="522358"/>
           </a:xfrm>
           <a:prstGeom prst="parallelogram">
@@ -3431,7 +3431,7 @@
         </p:nvSpPr>
         <p:spPr>
           <a:xfrm>
-            <a:off x="2834255" y="1652283"/>
+            <a:off x="2554542" y="2406466"/>
             <a:ext cx="1273857" cy="730639"/>
           </a:xfrm>
           <a:prstGeom prst="diamond">
@@ -3535,7 +3535,7 @@
         </p:nvSpPr>
         <p:spPr>
           <a:xfrm>
-            <a:off x="3992493" y="309870"/>
+            <a:off x="3928205" y="94427"/>
             <a:ext cx="1291866" cy="515099"/>
           </a:xfrm>
           <a:prstGeom prst="parallelogram">
@@ -3980,7 +3980,7 @@
         </p:nvSpPr>
         <p:spPr>
           <a:xfrm>
-            <a:off x="2220272" y="1740604"/>
+            <a:off x="1715193" y="2874676"/>
             <a:ext cx="464835" cy="276999"/>
           </a:xfrm>
           <a:prstGeom prst="rect">
@@ -4147,11 +4147,6 @@
               </a:rPr>
               <a:t>Player 2 wins</a:t>
             </a:r>
-            <a:endParaRPr lang="en-US" sz="800" b="1" dirty="0" smtClean="0">
-              <a:solidFill>
-                <a:srgbClr val="000000"/>
-              </a:solidFill>
-            </a:endParaRPr>
           </a:p>
         </p:txBody>
       </p:sp>
@@ -4307,11 +4302,6 @@
               </a:rPr>
               <a:t>Player 1 wins</a:t>
             </a:r>
-            <a:endParaRPr lang="en-US" sz="800" b="1" dirty="0" smtClean="0">
-              <a:solidFill>
-                <a:srgbClr val="000000"/>
-              </a:solidFill>
-            </a:endParaRPr>
           </a:p>
         </p:txBody>
       </p:sp>
@@ -4370,14 +4360,14 @@
           <p:cNvPr id="42" name="Elbow Connector 41"/>
           <p:cNvCxnSpPr>
             <a:stCxn id="20" idx="1"/>
-            <a:endCxn id="6" idx="0"/>
+            <a:endCxn id="60" idx="0"/>
           </p:cNvCxnSpPr>
           <p:nvPr/>
         </p:nvCxnSpPr>
         <p:spPr>
           <a:xfrm rot="10800000" flipV="1">
-            <a:off x="3471185" y="1333493"/>
-            <a:ext cx="725847" cy="318790"/>
+            <a:off x="3139459" y="1333492"/>
+            <a:ext cx="1057572" cy="212711"/>
           </a:xfrm>
           <a:prstGeom prst="bentConnector2">
             <a:avLst/>
@@ -4511,8 +4501,8 @@
         </p:nvCxnSpPr>
         <p:spPr>
           <a:xfrm rot="10800000" flipV="1">
-            <a:off x="2220273" y="2017603"/>
-            <a:ext cx="613982" cy="1211744"/>
+            <a:off x="2213006" y="2771786"/>
+            <a:ext cx="341536" cy="450276"/>
           </a:xfrm>
           <a:prstGeom prst="bentConnector2">
             <a:avLst/>
@@ -4546,9 +4536,9 @@
           <p:nvPr/>
         </p:nvCxnSpPr>
         <p:spPr>
-          <a:xfrm>
-            <a:off x="1819630" y="485362"/>
-            <a:ext cx="557050" cy="78565"/>
+          <a:xfrm flipV="1">
+            <a:off x="1331154" y="348347"/>
+            <a:ext cx="676798" cy="3630"/>
           </a:xfrm>
           <a:prstGeom prst="bentConnector3">
             <a:avLst/>
@@ -4583,8 +4573,8 @@
         </p:nvCxnSpPr>
         <p:spPr>
           <a:xfrm>
-            <a:off x="3469859" y="563927"/>
-            <a:ext cx="587021" cy="3493"/>
+            <a:off x="3101131" y="348347"/>
+            <a:ext cx="891461" cy="3630"/>
           </a:xfrm>
           <a:prstGeom prst="bentConnector3">
             <a:avLst/>
@@ -4619,13 +4609,13 @@
         </p:nvCxnSpPr>
         <p:spPr>
           <a:xfrm flipH="1">
-            <a:off x="4824401" y="567420"/>
-            <a:ext cx="395571" cy="406236"/>
+            <a:off x="4824401" y="351977"/>
+            <a:ext cx="331283" cy="621679"/>
           </a:xfrm>
           <a:prstGeom prst="bentConnector4">
             <a:avLst>
-              <a:gd name="adj1" fmla="val -57790"/>
-              <a:gd name="adj2" fmla="val 81699"/>
+              <a:gd name="adj1" fmla="val -69004"/>
+              <a:gd name="adj2" fmla="val 70714"/>
             </a:avLst>
           </a:prstGeom>
           <a:ln>
@@ -4658,8 +4648,8 @@
         </p:nvCxnSpPr>
         <p:spPr>
           <a:xfrm>
-            <a:off x="4108112" y="2017603"/>
-            <a:ext cx="222114" cy="1016842"/>
+            <a:off x="3828399" y="2771786"/>
+            <a:ext cx="501827" cy="262659"/>
           </a:xfrm>
           <a:prstGeom prst="bentConnector2">
             <a:avLst/>
@@ -4831,7 +4821,7 @@
         </p:nvSpPr>
         <p:spPr>
           <a:xfrm>
-            <a:off x="4360250" y="1990967"/>
+            <a:off x="4369873" y="2616190"/>
             <a:ext cx="490632" cy="276999"/>
           </a:xfrm>
           <a:prstGeom prst="rect">
@@ -5351,8 +5341,8 @@
         </p:nvCxnSpPr>
         <p:spPr>
           <a:xfrm flipV="1">
-            <a:off x="1099343" y="825106"/>
-            <a:ext cx="1758632" cy="607828"/>
+            <a:off x="1128636" y="609526"/>
+            <a:ext cx="1360611" cy="823408"/>
           </a:xfrm>
           <a:prstGeom prst="bentConnector2">
             <a:avLst/>
@@ -5432,6 +5422,94 @@
             <a:avLst>
               <a:gd name="adj1" fmla="val 248657"/>
             </a:avLst>
+          </a:prstGeom>
+          <a:ln>
+            <a:tailEnd type="arrow"/>
+          </a:ln>
+        </p:spPr>
+        <p:style>
+          <a:lnRef idx="2">
+            <a:schemeClr val="accent1"/>
+          </a:lnRef>
+          <a:fillRef idx="0">
+            <a:schemeClr val="accent1"/>
+          </a:fillRef>
+          <a:effectRef idx="1">
+            <a:schemeClr val="accent1"/>
+          </a:effectRef>
+          <a:fontRef idx="minor">
+            <a:schemeClr val="tx1"/>
+          </a:fontRef>
+        </p:style>
+      </p:cxnSp>
+      <p:sp>
+        <p:nvSpPr>
+          <p:cNvPr id="60" name="Rectangle 59"/>
+          <p:cNvSpPr/>
+          <p:nvPr/>
+        </p:nvSpPr>
+        <p:spPr>
+          <a:xfrm>
+            <a:off x="2613407" y="1546204"/>
+            <a:ext cx="1052104" cy="511932"/>
+          </a:xfrm>
+          <a:prstGeom prst="rect">
+            <a:avLst/>
+          </a:prstGeom>
+        </p:spPr>
+        <p:style>
+          <a:lnRef idx="2">
+            <a:schemeClr val="accent3">
+              <a:shade val="50000"/>
+            </a:schemeClr>
+          </a:lnRef>
+          <a:fillRef idx="1">
+            <a:schemeClr val="accent3"/>
+          </a:fillRef>
+          <a:effectRef idx="0">
+            <a:schemeClr val="accent3"/>
+          </a:effectRef>
+          <a:fontRef idx="minor">
+            <a:schemeClr val="lt1"/>
+          </a:fontRef>
+        </p:style>
+        <p:txBody>
+          <a:bodyPr rtlCol="0" anchor="ctr"/>
+          <a:lstStyle/>
+          <a:p>
+            <a:pPr algn="ctr"/>
+            <a:r>
+              <a:rPr lang="en-US" sz="800" dirty="0" smtClean="0">
+                <a:solidFill>
+                  <a:srgbClr val="000000"/>
+                </a:solidFill>
+              </a:rPr>
+              <a:t>Character name, damage, and health stored into individual arrays</a:t>
+            </a:r>
+            <a:endParaRPr lang="en-US" sz="800" dirty="0" smtClean="0">
+              <a:solidFill>
+                <a:srgbClr val="000000"/>
+              </a:solidFill>
+            </a:endParaRPr>
+          </a:p>
+        </p:txBody>
+      </p:sp>
+      <p:cxnSp>
+        <p:nvCxnSpPr>
+          <p:cNvPr id="13" name="Elbow Connector 12"/>
+          <p:cNvCxnSpPr>
+            <a:stCxn id="60" idx="2"/>
+            <a:endCxn id="6" idx="0"/>
+          </p:cNvCxnSpPr>
+          <p:nvPr/>
+        </p:nvCxnSpPr>
+        <p:spPr>
+          <a:xfrm rot="16200000" flipH="1">
+            <a:off x="2991300" y="2206295"/>
+            <a:ext cx="348330" cy="52012"/>
+          </a:xfrm>
+          <a:prstGeom prst="bentConnector3">
+            <a:avLst/>
           </a:prstGeom>
           <a:ln>
             <a:tailEnd type="arrow"/>

</xml_diff>